<commit_message>
Updated slides to match notebook
</commit_message>
<xml_diff>
--- a/GCDRI_TextAnalysisClass_2018.pptx
+++ b/GCDRI_TextAnalysisClass_2018.pptx
@@ -281,7 +281,7 @@
           <a:p>
             <a:fld id="{150CCB9D-1B9B-47F4-8DB6-98E50DE656BB}" type="datetimeFigureOut">
               <a:rPr lang="en-US" smtClean="0"/>
-              <a:t>1/5/2018</a:t>
+              <a:t>1/15/2018</a:t>
             </a:fld>
             <a:endParaRPr lang="en-US"/>
           </a:p>
@@ -448,7 +448,7 @@
             <a:fld id="{52C6B7FD-BAE6-4C3D-A9F7-76D38D5B831B}" type="datetimeFigureOut">
               <a:rPr lang="en-US" smtClean="0"/>
               <a:pPr/>
-              <a:t>1/5/2018</a:t>
+              <a:t>1/15/2018</a:t>
             </a:fld>
             <a:endParaRPr lang="en-US"/>
           </a:p>
@@ -851,6 +851,91 @@
           <a:bodyPr/>
           <a:lstStyle/>
           <a:p>
+            <a:endParaRPr lang="en-US" dirty="0"/>
+          </a:p>
+        </p:txBody>
+      </p:sp>
+      <p:sp>
+        <p:nvSpPr>
+          <p:cNvPr id="4" name="Slide Number Placeholder 3"/>
+          <p:cNvSpPr>
+            <a:spLocks noGrp="1"/>
+          </p:cNvSpPr>
+          <p:nvPr>
+            <p:ph type="sldNum" sz="quarter" idx="10"/>
+          </p:nvPr>
+        </p:nvSpPr>
+        <p:spPr/>
+        <p:txBody>
+          <a:bodyPr/>
+          <a:lstStyle/>
+          <a:p>
+            <a:fld id="{FEC298CD-A659-47E9-82BC-30F7F162BA47}" type="slidenum">
+              <a:rPr lang="en-US" smtClean="0"/>
+              <a:pPr/>
+              <a:t>61</a:t>
+            </a:fld>
+            <a:endParaRPr lang="en-US"/>
+          </a:p>
+        </p:txBody>
+      </p:sp>
+    </p:spTree>
+    <p:extLst>
+      <p:ext uri="{BB962C8B-B14F-4D97-AF65-F5344CB8AC3E}">
+        <p14:creationId xmlns:p14="http://schemas.microsoft.com/office/powerpoint/2010/main" val="3344404370"/>
+      </p:ext>
+    </p:extLst>
+  </p:cSld>
+  <p:clrMapOvr>
+    <a:masterClrMapping/>
+  </p:clrMapOvr>
+</p:notes>
+</file>
+
+<file path=ppt/notesSlides/notesSlide11.xml><?xml version="1.0" encoding="utf-8"?>
+<p:notes xmlns:a="http://schemas.openxmlformats.org/drawingml/2006/main" xmlns:r="http://schemas.openxmlformats.org/officeDocument/2006/relationships" xmlns:p="http://schemas.openxmlformats.org/presentationml/2006/main">
+  <p:cSld>
+    <p:spTree>
+      <p:nvGrpSpPr>
+        <p:cNvPr id="1" name=""/>
+        <p:cNvGrpSpPr/>
+        <p:nvPr/>
+      </p:nvGrpSpPr>
+      <p:grpSpPr>
+        <a:xfrm>
+          <a:off x="0" y="0"/>
+          <a:ext cx="0" cy="0"/>
+          <a:chOff x="0" y="0"/>
+          <a:chExt cx="0" cy="0"/>
+        </a:xfrm>
+      </p:grpSpPr>
+      <p:sp>
+        <p:nvSpPr>
+          <p:cNvPr id="2" name="Slide Image Placeholder 1"/>
+          <p:cNvSpPr>
+            <a:spLocks noGrp="1" noRot="1" noChangeAspect="1"/>
+          </p:cNvSpPr>
+          <p:nvPr>
+            <p:ph type="sldImg"/>
+          </p:nvPr>
+        </p:nvSpPr>
+        <p:spPr/>
+      </p:sp>
+      <p:sp>
+        <p:nvSpPr>
+          <p:cNvPr id="3" name="Notes Placeholder 2"/>
+          <p:cNvSpPr>
+            <a:spLocks noGrp="1"/>
+          </p:cNvSpPr>
+          <p:nvPr>
+            <p:ph type="body" idx="1"/>
+          </p:nvPr>
+        </p:nvSpPr>
+        <p:spPr/>
+        <p:txBody>
+          <a:bodyPr/>
+          <a:lstStyle/>
+          <a:p>
             <a:pPr marL="0" marR="0" lvl="0" indent="0" algn="l" defTabSz="914400" rtl="0" eaLnBrk="1" fontAlgn="auto" latinLnBrk="0" hangingPunct="1">
               <a:lnSpc>
                 <a:spcPct val="100000"/>
@@ -1059,7 +1144,7 @@
           <a:p>
             <a:r>
               <a:rPr lang="en-US" dirty="0" smtClean="0"/>
-              <a:t>4623 4431</a:t>
+              <a:t>Scaffold, add examples</a:t>
             </a:r>
             <a:endParaRPr lang="en-US" dirty="0"/>
           </a:p>
@@ -1083,7 +1168,7 @@
             <a:fld id="{FEC298CD-A659-47E9-82BC-30F7F162BA47}" type="slidenum">
               <a:rPr lang="en-US" smtClean="0"/>
               <a:pPr/>
-              <a:t>17</a:t>
+              <a:t>12</a:t>
             </a:fld>
             <a:endParaRPr lang="en-US"/>
           </a:p>
@@ -1092,7 +1177,7 @@
     </p:spTree>
     <p:extLst>
       <p:ext uri="{BB962C8B-B14F-4D97-AF65-F5344CB8AC3E}">
-        <p14:creationId xmlns:p14="http://schemas.microsoft.com/office/powerpoint/2010/main" val="2249727856"/>
+        <p14:creationId xmlns:p14="http://schemas.microsoft.com/office/powerpoint/2010/main" val="1134115583"/>
       </p:ext>
     </p:extLst>
   </p:cSld>
@@ -1146,6 +1231,10 @@
           <a:bodyPr/>
           <a:lstStyle/>
           <a:p>
+            <a:r>
+              <a:rPr lang="en-US" dirty="0" smtClean="0"/>
+              <a:t>4623 4431</a:t>
+            </a:r>
             <a:endParaRPr lang="en-US" dirty="0"/>
           </a:p>
         </p:txBody>
@@ -1168,7 +1257,7 @@
             <a:fld id="{FEC298CD-A659-47E9-82BC-30F7F162BA47}" type="slidenum">
               <a:rPr lang="en-US" smtClean="0"/>
               <a:pPr/>
-              <a:t>19</a:t>
+              <a:t>17</a:t>
             </a:fld>
             <a:endParaRPr lang="en-US"/>
           </a:p>
@@ -1177,7 +1266,7 @@
     </p:spTree>
     <p:extLst>
       <p:ext uri="{BB962C8B-B14F-4D97-AF65-F5344CB8AC3E}">
-        <p14:creationId xmlns:p14="http://schemas.microsoft.com/office/powerpoint/2010/main" val="2777163778"/>
+        <p14:creationId xmlns:p14="http://schemas.microsoft.com/office/powerpoint/2010/main" val="2249727856"/>
       </p:ext>
     </p:extLst>
   </p:cSld>
@@ -1231,10 +1320,6 @@
           <a:bodyPr/>
           <a:lstStyle/>
           <a:p>
-            <a:r>
-              <a:rPr lang="en-US" dirty="0" smtClean="0"/>
-              <a:t>4623 4431</a:t>
-            </a:r>
             <a:endParaRPr lang="en-US" dirty="0"/>
           </a:p>
         </p:txBody>
@@ -1257,7 +1342,7 @@
             <a:fld id="{FEC298CD-A659-47E9-82BC-30F7F162BA47}" type="slidenum">
               <a:rPr lang="en-US" smtClean="0"/>
               <a:pPr/>
-              <a:t>21</a:t>
+              <a:t>19</a:t>
             </a:fld>
             <a:endParaRPr lang="en-US"/>
           </a:p>
@@ -1266,7 +1351,7 @@
     </p:spTree>
     <p:extLst>
       <p:ext uri="{BB962C8B-B14F-4D97-AF65-F5344CB8AC3E}">
-        <p14:creationId xmlns:p14="http://schemas.microsoft.com/office/powerpoint/2010/main" val="4007624688"/>
+        <p14:creationId xmlns:p14="http://schemas.microsoft.com/office/powerpoint/2010/main" val="2777163778"/>
       </p:ext>
     </p:extLst>
   </p:cSld>
@@ -1322,7 +1407,7 @@
           <a:p>
             <a:r>
               <a:rPr lang="en-US" dirty="0" smtClean="0"/>
-              <a:t>Delete slide?</a:t>
+              <a:t>4623 4431</a:t>
             </a:r>
             <a:endParaRPr lang="en-US" dirty="0"/>
           </a:p>
@@ -1346,7 +1431,7 @@
             <a:fld id="{FEC298CD-A659-47E9-82BC-30F7F162BA47}" type="slidenum">
               <a:rPr lang="en-US" smtClean="0"/>
               <a:pPr/>
-              <a:t>49</a:t>
+              <a:t>21</a:t>
             </a:fld>
             <a:endParaRPr lang="en-US"/>
           </a:p>
@@ -1355,7 +1440,7 @@
     </p:spTree>
     <p:extLst>
       <p:ext uri="{BB962C8B-B14F-4D97-AF65-F5344CB8AC3E}">
-        <p14:creationId xmlns:p14="http://schemas.microsoft.com/office/powerpoint/2010/main" val="2056699138"/>
+        <p14:creationId xmlns:p14="http://schemas.microsoft.com/office/powerpoint/2010/main" val="4007624688"/>
       </p:ext>
     </p:extLst>
   </p:cSld>
@@ -1411,7 +1496,7 @@
           <a:p>
             <a:r>
               <a:rPr lang="en-US" dirty="0" smtClean="0"/>
-              <a:t>342, 158], [168, 332</a:t>
+              <a:t>Delete slide?</a:t>
             </a:r>
             <a:endParaRPr lang="en-US" dirty="0"/>
           </a:p>
@@ -1435,7 +1520,7 @@
             <a:fld id="{FEC298CD-A659-47E9-82BC-30F7F162BA47}" type="slidenum">
               <a:rPr lang="en-US" smtClean="0"/>
               <a:pPr/>
-              <a:t>52</a:t>
+              <a:t>49</a:t>
             </a:fld>
             <a:endParaRPr lang="en-US"/>
           </a:p>
@@ -1444,7 +1529,7 @@
     </p:spTree>
     <p:extLst>
       <p:ext uri="{BB962C8B-B14F-4D97-AF65-F5344CB8AC3E}">
-        <p14:creationId xmlns:p14="http://schemas.microsoft.com/office/powerpoint/2010/main" val="374096631"/>
+        <p14:creationId xmlns:p14="http://schemas.microsoft.com/office/powerpoint/2010/main" val="2056699138"/>
       </p:ext>
     </p:extLst>
   </p:cSld>
@@ -1495,12 +1580,14 @@
         </p:nvSpPr>
         <p:spPr/>
         <p:txBody>
-          <a:bodyPr>
-            <a:normAutofit/>
-          </a:bodyPr>
-          <a:lstStyle/>
-          <a:p>
-            <a:endParaRPr lang="en-US"/>
+          <a:bodyPr/>
+          <a:lstStyle/>
+          <a:p>
+            <a:r>
+              <a:rPr lang="en-US" dirty="0" smtClean="0"/>
+              <a:t>342, 158], [168, 332</a:t>
+            </a:r>
+            <a:endParaRPr lang="en-US" dirty="0"/>
           </a:p>
         </p:txBody>
       </p:sp>
@@ -1522,7 +1609,7 @@
             <a:fld id="{FEC298CD-A659-47E9-82BC-30F7F162BA47}" type="slidenum">
               <a:rPr lang="en-US" smtClean="0"/>
               <a:pPr/>
-              <a:t>57</a:t>
+              <a:t>52</a:t>
             </a:fld>
             <a:endParaRPr lang="en-US"/>
           </a:p>
@@ -1531,7 +1618,7 @@
     </p:spTree>
     <p:extLst>
       <p:ext uri="{BB962C8B-B14F-4D97-AF65-F5344CB8AC3E}">
-        <p14:creationId xmlns:p14="http://schemas.microsoft.com/office/powerpoint/2010/main" val="2273317876"/>
+        <p14:creationId xmlns:p14="http://schemas.microsoft.com/office/powerpoint/2010/main" val="374096631"/>
       </p:ext>
     </p:extLst>
   </p:cSld>
@@ -1582,10 +1669,12 @@
         </p:nvSpPr>
         <p:spPr/>
         <p:txBody>
-          <a:bodyPr/>
-          <a:lstStyle/>
-          <a:p>
-            <a:endParaRPr lang="en-US" dirty="0"/>
+          <a:bodyPr>
+            <a:normAutofit/>
+          </a:bodyPr>
+          <a:lstStyle/>
+          <a:p>
+            <a:endParaRPr lang="en-US"/>
           </a:p>
         </p:txBody>
       </p:sp>
@@ -1607,7 +1696,7 @@
             <a:fld id="{FEC298CD-A659-47E9-82BC-30F7F162BA47}" type="slidenum">
               <a:rPr lang="en-US" smtClean="0"/>
               <a:pPr/>
-              <a:t>61</a:t>
+              <a:t>57</a:t>
             </a:fld>
             <a:endParaRPr lang="en-US"/>
           </a:p>
@@ -1616,7 +1705,7 @@
     </p:spTree>
     <p:extLst>
       <p:ext uri="{BB962C8B-B14F-4D97-AF65-F5344CB8AC3E}">
-        <p14:creationId xmlns:p14="http://schemas.microsoft.com/office/powerpoint/2010/main" val="3344404370"/>
+        <p14:creationId xmlns:p14="http://schemas.microsoft.com/office/powerpoint/2010/main" val="2273317876"/>
       </p:ext>
     </p:extLst>
   </p:cSld>
@@ -1814,7 +1903,7 @@
           <a:p>
             <a:fld id="{969A2BE3-F7BD-4921-9646-56D43733DB58}" type="datetime1">
               <a:rPr lang="en-US" smtClean="0"/>
-              <a:t>1/5/2018</a:t>
+              <a:t>1/15/2018</a:t>
             </a:fld>
             <a:endParaRPr lang="en-US"/>
           </a:p>
@@ -2015,7 +2104,7 @@
           <a:p>
             <a:fld id="{B5D6DD7A-D2D9-415C-805B-D618FB2576BA}" type="datetime1">
               <a:rPr lang="en-US" smtClean="0"/>
-              <a:t>1/5/2018</a:t>
+              <a:t>1/15/2018</a:t>
             </a:fld>
             <a:endParaRPr lang="en-US"/>
           </a:p>
@@ -2191,7 +2280,7 @@
           <a:p>
             <a:fld id="{530A6422-C3AD-4AF3-8353-B14C5539A44F}" type="datetime1">
               <a:rPr lang="en-US" smtClean="0"/>
-              <a:t>1/5/2018</a:t>
+              <a:t>1/15/2018</a:t>
             </a:fld>
             <a:endParaRPr lang="en-US"/>
           </a:p>
@@ -2357,7 +2446,7 @@
           <a:p>
             <a:fld id="{D949D6C3-51FD-47D7-89DE-D5A382518525}" type="datetime1">
               <a:rPr lang="en-US" smtClean="0"/>
-              <a:t>1/5/2018</a:t>
+              <a:t>1/15/2018</a:t>
             </a:fld>
             <a:endParaRPr lang="en-US"/>
           </a:p>
@@ -2606,7 +2695,7 @@
           <a:p>
             <a:fld id="{B28540E0-5FA1-4FA6-9A87-E9ABF974AF63}" type="datetime1">
               <a:rPr lang="en-US" smtClean="0"/>
-              <a:t>1/5/2018</a:t>
+              <a:t>1/15/2018</a:t>
             </a:fld>
             <a:endParaRPr lang="en-US"/>
           </a:p>
@@ -2925,7 +3014,7 @@
           <a:p>
             <a:fld id="{1F93D3D3-DC59-4D84-8BC5-A3B2B69D22C0}" type="datetime1">
               <a:rPr lang="en-US" smtClean="0"/>
-              <a:t>1/5/2018</a:t>
+              <a:t>1/15/2018</a:t>
             </a:fld>
             <a:endParaRPr lang="en-US"/>
           </a:p>
@@ -3392,7 +3481,7 @@
           <a:p>
             <a:fld id="{A3C125DD-FD59-468C-9698-CB036FC73A21}" type="datetime1">
               <a:rPr lang="en-US" smtClean="0"/>
-              <a:t>1/5/2018</a:t>
+              <a:t>1/15/2018</a:t>
             </a:fld>
             <a:endParaRPr lang="en-US"/>
           </a:p>
@@ -3541,7 +3630,7 @@
           <a:p>
             <a:fld id="{BC0DF5DD-B2DB-406B-83A6-25791A22338F}" type="datetime1">
               <a:rPr lang="en-US" smtClean="0"/>
-              <a:t>1/5/2018</a:t>
+              <a:t>1/15/2018</a:t>
             </a:fld>
             <a:endParaRPr lang="en-US"/>
           </a:p>
@@ -3632,7 +3721,7 @@
           <a:p>
             <a:fld id="{71DFC9D3-0999-4EE1-987C-69B9058C8FB0}" type="datetime1">
               <a:rPr lang="en-US" smtClean="0"/>
-              <a:t>1/5/2018</a:t>
+              <a:t>1/15/2018</a:t>
             </a:fld>
             <a:endParaRPr lang="en-US"/>
           </a:p>
@@ -3907,7 +3996,7 @@
           <a:p>
             <a:fld id="{33A53A9C-88DD-4F7F-8C11-D4AFF6C2E980}" type="datetime1">
               <a:rPr lang="en-US" smtClean="0"/>
-              <a:t>1/5/2018</a:t>
+              <a:t>1/15/2018</a:t>
             </a:fld>
             <a:endParaRPr lang="en-US"/>
           </a:p>
@@ -4213,7 +4302,7 @@
           <a:p>
             <a:fld id="{D1F0850E-6CEB-427B-BB04-B700BBA3046E}" type="datetime1">
               <a:rPr lang="en-US" smtClean="0"/>
-              <a:t>1/5/2018</a:t>
+              <a:t>1/15/2018</a:t>
             </a:fld>
             <a:endParaRPr lang="en-US"/>
           </a:p>
@@ -4512,7 +4601,7 @@
           <a:p>
             <a:fld id="{3D8F062B-09D6-4570-9B5F-5676EC2BB5E9}" type="datetime1">
               <a:rPr lang="en-US" smtClean="0"/>
-              <a:t>1/5/2018</a:t>
+              <a:t>1/15/2018</a:t>
             </a:fld>
             <a:endParaRPr lang="en-US"/>
           </a:p>
@@ -5102,6 +5191,28 @@
               <a:rPr lang="en-US" dirty="0" smtClean="0"/>
               <a:t> returns tokenized text</a:t>
             </a:r>
+          </a:p>
+          <a:p>
+            <a:pPr lvl="1"/>
+            <a:r>
+              <a:rPr lang="en-US" dirty="0" smtClean="0"/>
+              <a:t>A </a:t>
+            </a:r>
+            <a:r>
+              <a:rPr lang="en-US" b="1" dirty="0" smtClean="0"/>
+              <a:t>token</a:t>
+            </a:r>
+            <a:r>
+              <a:rPr lang="en-US" dirty="0" smtClean="0"/>
+              <a:t> marks a meaningful element of words, symbols, or phrases</a:t>
+            </a:r>
+          </a:p>
+          <a:p>
+            <a:pPr lvl="2"/>
+            <a:r>
+              <a:rPr lang="en-US" dirty="0" smtClean="0"/>
+              <a:t>Can distinguish “hello.” from “hello” “.” </a:t>
+            </a:r>
             <a:endParaRPr lang="en-US" dirty="0"/>
           </a:p>
         </p:txBody>
@@ -5275,6 +5386,104 @@
                                           <p:spTgt spid="3">
                                             <p:txEl>
                                               <p:pRg st="3" end="3"/>
+                                            </p:txEl>
+                                          </p:spTgt>
+                                        </p:tgtEl>
+                                        <p:attrNameLst>
+                                          <p:attrName>style.visibility</p:attrName>
+                                        </p:attrNameLst>
+                                      </p:cBhvr>
+                                      <p:to>
+                                        <p:strVal val="visible"/>
+                                      </p:to>
+                                    </p:set>
+                                  </p:childTnLst>
+                                </p:cTn>
+                              </p:par>
+                            </p:childTnLst>
+                          </p:cTn>
+                        </p:par>
+                      </p:childTnLst>
+                    </p:cTn>
+                  </p:par>
+                  <p:par>
+                    <p:cTn id="15" fill="hold">
+                      <p:stCondLst>
+                        <p:cond delay="indefinite"/>
+                      </p:stCondLst>
+                      <p:childTnLst>
+                        <p:par>
+                          <p:cTn id="16" fill="hold">
+                            <p:stCondLst>
+                              <p:cond delay="0"/>
+                            </p:stCondLst>
+                            <p:childTnLst>
+                              <p:par>
+                                <p:cTn id="17" presetID="1" presetClass="entr" presetSubtype="0" fill="hold" nodeType="clickEffect">
+                                  <p:stCondLst>
+                                    <p:cond delay="0"/>
+                                  </p:stCondLst>
+                                  <p:childTnLst>
+                                    <p:set>
+                                      <p:cBhvr>
+                                        <p:cTn id="18" dur="1" fill="hold">
+                                          <p:stCondLst>
+                                            <p:cond delay="0"/>
+                                          </p:stCondLst>
+                                        </p:cTn>
+                                        <p:tgtEl>
+                                          <p:spTgt spid="3">
+                                            <p:txEl>
+                                              <p:pRg st="4" end="4"/>
+                                            </p:txEl>
+                                          </p:spTgt>
+                                        </p:tgtEl>
+                                        <p:attrNameLst>
+                                          <p:attrName>style.visibility</p:attrName>
+                                        </p:attrNameLst>
+                                      </p:cBhvr>
+                                      <p:to>
+                                        <p:strVal val="visible"/>
+                                      </p:to>
+                                    </p:set>
+                                  </p:childTnLst>
+                                </p:cTn>
+                              </p:par>
+                            </p:childTnLst>
+                          </p:cTn>
+                        </p:par>
+                      </p:childTnLst>
+                    </p:cTn>
+                  </p:par>
+                  <p:par>
+                    <p:cTn id="19" fill="hold">
+                      <p:stCondLst>
+                        <p:cond delay="indefinite"/>
+                      </p:stCondLst>
+                      <p:childTnLst>
+                        <p:par>
+                          <p:cTn id="20" fill="hold">
+                            <p:stCondLst>
+                              <p:cond delay="0"/>
+                            </p:stCondLst>
+                            <p:childTnLst>
+                              <p:par>
+                                <p:cTn id="21" presetID="1" presetClass="entr" presetSubtype="0" fill="hold" nodeType="clickEffect">
+                                  <p:stCondLst>
+                                    <p:cond delay="0"/>
+                                  </p:stCondLst>
+                                  <p:childTnLst>
+                                    <p:set>
+                                      <p:cBhvr>
+                                        <p:cTn id="22" dur="1" fill="hold">
+                                          <p:stCondLst>
+                                            <p:cond delay="0"/>
+                                          </p:stCondLst>
+                                        </p:cTn>
+                                        <p:tgtEl>
+                                          <p:spTgt spid="3">
+                                            <p:txEl>
+                                              <p:pRg st="5" end="5"/>
                                             </p:txEl>
                                           </p:spTgt>
                                         </p:tgtEl>
@@ -9942,11 +10151,7 @@
             <a:pPr lvl="1"/>
             <a:r>
               <a:rPr lang="en-US" dirty="0" smtClean="0"/>
-              <a:t>This </a:t>
-            </a:r>
-            <a:r>
-              <a:rPr lang="en-US" dirty="0" smtClean="0"/>
-              <a:t>task predicts a </a:t>
+              <a:t>This task predicts a </a:t>
             </a:r>
             <a:r>
               <a:rPr lang="en-US" b="1" dirty="0" smtClean="0"/>
@@ -9981,11 +10186,7 @@
           <a:p>
             <a:r>
               <a:rPr lang="en-US" dirty="0" smtClean="0"/>
-              <a:t>Another type </a:t>
-            </a:r>
-            <a:r>
-              <a:rPr lang="en-US" dirty="0" smtClean="0"/>
-              <a:t>of machine learning task is a </a:t>
+              <a:t>Another type of machine learning task is a </a:t>
             </a:r>
             <a:r>
               <a:rPr lang="en-US" i="1" dirty="0" smtClean="0"/>
@@ -10032,7 +10233,6 @@
               <a:rPr lang="en-US" dirty="0" smtClean="0"/>
               <a:t>Groups unlabeled data points by proximity</a:t>
             </a:r>
-            <a:endParaRPr lang="en-US" dirty="0" smtClean="0"/>
           </a:p>
         </p:txBody>
       </p:sp>
@@ -13004,6 +13204,21 @@
             <a:r>
               <a:rPr lang="en-US" dirty="0" smtClean="0"/>
               <a:t>The Natural Language Toolkit (NLTK)</a:t>
+            </a:r>
+          </a:p>
+          <a:p>
+            <a:pPr lvl="1"/>
+            <a:r>
+              <a:rPr lang="en-US" dirty="0" smtClean="0"/>
+              <a:t>Including book corpus (from </a:t>
+            </a:r>
+            <a:r>
+              <a:rPr lang="en-US" dirty="0" err="1" smtClean="0"/>
+              <a:t>nltk.book</a:t>
+            </a:r>
+            <a:r>
+              <a:rPr lang="en-US" dirty="0" smtClean="0"/>
+              <a:t> import *)</a:t>
             </a:r>
           </a:p>
           <a:p>
@@ -26942,13 +27157,35 @@
           <a:p>
             <a:r>
               <a:rPr lang="en-US" dirty="0" smtClean="0"/>
-              <a:t>Come to Digital Fellows workshops!</a:t>
-            </a:r>
-          </a:p>
-          <a:p>
-            <a:r>
-              <a:rPr lang="en-US" dirty="0" smtClean="0"/>
-              <a:t>Come to Python Users Group!</a:t>
+              <a:t>Come to Digital Fellows workshops</a:t>
+            </a:r>
+            <a:r>
+              <a:rPr lang="en-US" dirty="0" smtClean="0"/>
+              <a:t>!</a:t>
+            </a:r>
+          </a:p>
+          <a:p>
+            <a:r>
+              <a:rPr lang="en-US" dirty="0" smtClean="0"/>
+              <a:t>Come to Office Hours!</a:t>
+            </a:r>
+          </a:p>
+          <a:p>
+            <a:pPr lvl="1"/>
+            <a:r>
+              <a:rPr lang="en-US" dirty="0" smtClean="0"/>
+              <a:t>(For additional information about office hours, email the digital fellows!)</a:t>
+            </a:r>
+            <a:endParaRPr lang="en-US" dirty="0" smtClean="0"/>
+          </a:p>
+          <a:p>
+            <a:r>
+              <a:rPr lang="en-US" dirty="0" smtClean="0"/>
+              <a:t>Come </a:t>
+            </a:r>
+            <a:r>
+              <a:rPr lang="en-US" dirty="0" smtClean="0"/>
+              <a:t>to Python Users Group!</a:t>
             </a:r>
           </a:p>
           <a:p>
@@ -27483,15 +27720,6 @@
             </a:r>
           </a:p>
           <a:p>
-            <a:pPr marL="0" indent="0">
-              <a:buNone/>
-            </a:pPr>
-            <a:endParaRPr lang="en-US" dirty="0" smtClean="0"/>
-          </a:p>
-          <a:p>
-            <a:pPr marL="0" indent="0" algn="ctr">
-              <a:buNone/>
-            </a:pPr>
             <a:r>
               <a:rPr lang="en-US" dirty="0" smtClean="0">
                 <a:latin typeface="Courier New" panose="02070309020205020404" pitchFamily="49" charset="0"/>
@@ -27506,28 +27734,18 @@
               </a:rPr>
               <a:t>nltk</a:t>
             </a:r>
-            <a:endParaRPr lang="en-US" dirty="0" smtClean="0">
+            <a:endParaRPr lang="en-US" dirty="0">
               <a:latin typeface="Courier New" panose="02070309020205020404" pitchFamily="49" charset="0"/>
               <a:cs typeface="Courier New" panose="02070309020205020404" pitchFamily="49" charset="0"/>
             </a:endParaRPr>
           </a:p>
           <a:p>
-            <a:pPr marL="0" indent="0" algn="ctr">
-              <a:buNone/>
-            </a:pPr>
-            <a:r>
-              <a:rPr lang="en-US" dirty="0">
-                <a:latin typeface="Courier New" panose="02070309020205020404" pitchFamily="49" charset="0"/>
-                <a:cs typeface="Courier New" panose="02070309020205020404" pitchFamily="49" charset="0"/>
-              </a:rPr>
-              <a:t>i</a:t>
-            </a:r>
             <a:r>
               <a:rPr lang="en-US" dirty="0" smtClean="0">
                 <a:latin typeface="Courier New" panose="02070309020205020404" pitchFamily="49" charset="0"/>
                 <a:cs typeface="Courier New" panose="02070309020205020404" pitchFamily="49" charset="0"/>
               </a:rPr>
-              <a:t>mport </a:t>
+              <a:t>import </a:t>
             </a:r>
             <a:r>
               <a:rPr lang="en-US" dirty="0" err="1" smtClean="0">
@@ -27536,15 +27754,12 @@
               </a:rPr>
               <a:t>matplotlib</a:t>
             </a:r>
-            <a:endParaRPr lang="en-US" dirty="0" smtClean="0">
+            <a:endParaRPr lang="en-US" dirty="0">
               <a:latin typeface="Courier New" panose="02070309020205020404" pitchFamily="49" charset="0"/>
               <a:cs typeface="Courier New" panose="02070309020205020404" pitchFamily="49" charset="0"/>
             </a:endParaRPr>
           </a:p>
           <a:p>
-            <a:pPr marL="0" indent="0" algn="ctr">
-              <a:buNone/>
-            </a:pPr>
             <a:r>
               <a:rPr lang="en-US" dirty="0" smtClean="0">
                 <a:latin typeface="Courier New" panose="02070309020205020404" pitchFamily="49" charset="0"/>
@@ -27870,7 +28085,7 @@
                                         <p:tgtEl>
                                           <p:spTgt spid="3">
                                             <p:txEl>
-                                              <p:pRg st="6" end="6"/>
+                                              <p:pRg st="5" end="5"/>
                                             </p:txEl>
                                           </p:spTgt>
                                         </p:tgtEl>
@@ -27919,7 +28134,7 @@
                                         <p:tgtEl>
                                           <p:spTgt spid="3">
                                             <p:txEl>
-                                              <p:pRg st="7" end="7"/>
+                                              <p:pRg st="6" end="6"/>
                                             </p:txEl>
                                           </p:spTgt>
                                         </p:tgtEl>
@@ -27968,7 +28183,7 @@
                                         <p:tgtEl>
                                           <p:spTgt spid="3">
                                             <p:txEl>
-                                              <p:pRg st="8" end="8"/>
+                                              <p:pRg st="7" end="7"/>
                                             </p:txEl>
                                           </p:spTgt>
                                         </p:tgtEl>
@@ -32237,16 +32452,25 @@
             <p:ph type="title"/>
           </p:nvPr>
         </p:nvSpPr>
-        <p:spPr/>
+        <p:spPr>
+          <a:xfrm>
+            <a:off x="457200" y="609600"/>
+            <a:ext cx="8229600" cy="990600"/>
+          </a:xfrm>
+        </p:spPr>
         <p:txBody>
           <a:bodyPr>
-            <a:normAutofit fontScale="90000"/>
+            <a:normAutofit/>
           </a:bodyPr>
           <a:lstStyle/>
           <a:p>
             <a:r>
               <a:rPr lang="en-US" dirty="0" smtClean="0"/>
-              <a:t>Text Analysis: start with looking at what you’ve got</a:t>
+              <a:t>Text Analysis: </a:t>
+            </a:r>
+            <a:r>
+              <a:rPr lang="en-US" dirty="0" smtClean="0"/>
+              <a:t>Let’s begin!</a:t>
             </a:r>
             <a:endParaRPr lang="en-US" dirty="0"/>
           </a:p>
@@ -32279,28 +32503,13 @@
             <a:pPr lvl="1"/>
             <a:r>
               <a:rPr lang="en-US" dirty="0" smtClean="0"/>
-              <a:t>Takes two words as an argument, returns contexts in which they appear similarly across the text (within one text)</a:t>
-            </a:r>
-          </a:p>
-          <a:p>
-            <a:r>
-              <a:rPr lang="en-US" dirty="0" smtClean="0"/>
-              <a:t>Word locations across text</a:t>
-            </a:r>
-          </a:p>
-          <a:p>
-            <a:pPr lvl="1"/>
-            <a:r>
-              <a:rPr lang="en-US" dirty="0" smtClean="0"/>
-              <a:t>Create a dispersion plot to see where particular words occur in your text</a:t>
-            </a:r>
-          </a:p>
-          <a:p>
-            <a:pPr lvl="2"/>
-            <a:r>
-              <a:rPr lang="en-US" dirty="0" smtClean="0"/>
-              <a:t>Takes a list of words as an argument</a:t>
-            </a:r>
+              <a:t>Takes two words as an argument, returns contexts in which they appear similarly across the text (within one text</a:t>
+            </a:r>
+            <a:r>
+              <a:rPr lang="en-US" dirty="0" smtClean="0"/>
+              <a:t>)</a:t>
+            </a:r>
+            <a:endParaRPr lang="en-US" dirty="0" smtClean="0"/>
           </a:p>
         </p:txBody>
       </p:sp>
@@ -32406,117 +32615,6 @@
                                           <p:spTgt spid="3">
                                             <p:txEl>
                                               <p:pRg st="2" end="2"/>
-                                            </p:txEl>
-                                          </p:spTgt>
-                                        </p:tgtEl>
-                                        <p:attrNameLst>
-                                          <p:attrName>style.visibility</p:attrName>
-                                        </p:attrNameLst>
-                                      </p:cBhvr>
-                                      <p:to>
-                                        <p:strVal val="visible"/>
-                                      </p:to>
-                                    </p:set>
-                                  </p:childTnLst>
-                                </p:cTn>
-                              </p:par>
-                            </p:childTnLst>
-                          </p:cTn>
-                        </p:par>
-                      </p:childTnLst>
-                    </p:cTn>
-                  </p:par>
-                  <p:par>
-                    <p:cTn id="9" fill="hold">
-                      <p:stCondLst>
-                        <p:cond delay="indefinite"/>
-                      </p:stCondLst>
-                      <p:childTnLst>
-                        <p:par>
-                          <p:cTn id="10" fill="hold">
-                            <p:stCondLst>
-                              <p:cond delay="0"/>
-                            </p:stCondLst>
-                            <p:childTnLst>
-                              <p:par>
-                                <p:cTn id="11" presetID="1" presetClass="entr" presetSubtype="0" fill="hold" nodeType="clickEffect">
-                                  <p:stCondLst>
-                                    <p:cond delay="0"/>
-                                  </p:stCondLst>
-                                  <p:childTnLst>
-                                    <p:set>
-                                      <p:cBhvr>
-                                        <p:cTn id="12" dur="1" fill="hold">
-                                          <p:stCondLst>
-                                            <p:cond delay="0"/>
-                                          </p:stCondLst>
-                                        </p:cTn>
-                                        <p:tgtEl>
-                                          <p:spTgt spid="3">
-                                            <p:txEl>
-                                              <p:pRg st="3" end="3"/>
-                                            </p:txEl>
-                                          </p:spTgt>
-                                        </p:tgtEl>
-                                        <p:attrNameLst>
-                                          <p:attrName>style.visibility</p:attrName>
-                                        </p:attrNameLst>
-                                      </p:cBhvr>
-                                      <p:to>
-                                        <p:strVal val="visible"/>
-                                      </p:to>
-                                    </p:set>
-                                  </p:childTnLst>
-                                </p:cTn>
-                              </p:par>
-                              <p:par>
-                                <p:cTn id="13" presetID="1" presetClass="entr" presetSubtype="0" fill="hold" nodeType="withEffect">
-                                  <p:stCondLst>
-                                    <p:cond delay="0"/>
-                                  </p:stCondLst>
-                                  <p:childTnLst>
-                                    <p:set>
-                                      <p:cBhvr>
-                                        <p:cTn id="14" dur="1" fill="hold">
-                                          <p:stCondLst>
-                                            <p:cond delay="0"/>
-                                          </p:stCondLst>
-                                        </p:cTn>
-                                        <p:tgtEl>
-                                          <p:spTgt spid="3">
-                                            <p:txEl>
-                                              <p:pRg st="4" end="4"/>
-                                            </p:txEl>
-                                          </p:spTgt>
-                                        </p:tgtEl>
-                                        <p:attrNameLst>
-                                          <p:attrName>style.visibility</p:attrName>
-                                        </p:attrNameLst>
-                                      </p:cBhvr>
-                                      <p:to>
-                                        <p:strVal val="visible"/>
-                                      </p:to>
-                                    </p:set>
-                                  </p:childTnLst>
-                                </p:cTn>
-                              </p:par>
-                              <p:par>
-                                <p:cTn id="15" presetID="1" presetClass="entr" presetSubtype="0" fill="hold" nodeType="withEffect">
-                                  <p:stCondLst>
-                                    <p:cond delay="0"/>
-                                  </p:stCondLst>
-                                  <p:childTnLst>
-                                    <p:set>
-                                      <p:cBhvr>
-                                        <p:cTn id="16" dur="1" fill="hold">
-                                          <p:stCondLst>
-                                            <p:cond delay="0"/>
-                                          </p:stCondLst>
-                                        </p:cTn>
-                                        <p:tgtEl>
-                                          <p:spTgt spid="3">
-                                            <p:txEl>
-                                              <p:pRg st="5" end="5"/>
                                             </p:txEl>
                                           </p:spTgt>
                                         </p:tgtEl>

</xml_diff>